<commit_message>
sửap ppt cho hiệp
</commit_message>
<xml_diff>
--- a/ppt.pptx
+++ b/ppt.pptx
@@ -23,12 +23,19 @@
   <p:notesSz cx="8229600" cy="14630400"/>
   <p:embeddedFontLst>
     <p:embeddedFont>
+      <p:font typeface="Calibri" panose="020F0502020204030204" pitchFamily="34" charset="0"/>
+      <p:regular r:id="rId13"/>
+      <p:bold r:id="rId14"/>
+      <p:italic r:id="rId15"/>
+      <p:boldItalic r:id="rId16"/>
+    </p:embeddedFont>
+    <p:embeddedFont>
       <p:font typeface="Lora" pitchFamily="2" charset="0"/>
-      <p:regular r:id="rId13"/>
+      <p:regular r:id="rId17"/>
     </p:embeddedFont>
     <p:embeddedFont>
       <p:font typeface="Source Sans Pro" panose="020B0503030403020204" pitchFamily="34" charset="0"/>
-      <p:regular r:id="rId14"/>
+      <p:regular r:id="rId18"/>
     </p:embeddedFont>
   </p:embeddedFontLst>
   <p:defaultTextStyle>
@@ -5048,7 +5055,7 @@
         </p:nvSpPr>
         <p:spPr>
           <a:xfrm>
-            <a:off x="7999690" y="2779276"/>
+            <a:off x="7999690" y="2680097"/>
             <a:ext cx="5792986" cy="766048"/>
           </a:xfrm>
           <a:prstGeom prst="rect">
@@ -5076,7 +5083,122 @@
                 <a:ea typeface="Source Sans Pro" pitchFamily="34" charset="-122"/>
                 <a:cs typeface="Source Sans Pro" pitchFamily="34" charset="-120"/>
               </a:rPr>
-              <a:t>Xe vào bãi: Kiểm tra khoảng cách, chọn ô trống, chụp ảnh xe, mở cổng.</a:t>
+              <a:t>Xe vào bãi: Kiểm tra khoảng cách, chọn ô trống, chụp </a:t>
+            </a:r>
+            <a:r>
+              <a:rPr lang="en-US" sz="1850" dirty="0" err="1">
+                <a:solidFill>
+                  <a:srgbClr val="3A3630"/>
+                </a:solidFill>
+                <a:latin typeface="Source Sans Pro" pitchFamily="34" charset="0"/>
+                <a:ea typeface="Source Sans Pro" pitchFamily="34" charset="-122"/>
+                <a:cs typeface="Source Sans Pro" pitchFamily="34" charset="-120"/>
+              </a:rPr>
+              <a:t>ảnh</a:t>
+            </a:r>
+            <a:r>
+              <a:rPr lang="en-US" sz="1850" dirty="0">
+                <a:solidFill>
+                  <a:srgbClr val="3A3630"/>
+                </a:solidFill>
+                <a:latin typeface="Source Sans Pro" pitchFamily="34" charset="0"/>
+                <a:ea typeface="Source Sans Pro" pitchFamily="34" charset="-122"/>
+                <a:cs typeface="Source Sans Pro" pitchFamily="34" charset="-120"/>
+              </a:rPr>
+              <a:t> </a:t>
+            </a:r>
+            <a:r>
+              <a:rPr lang="vi-VN" sz="1850" dirty="0">
+                <a:solidFill>
+                  <a:srgbClr val="3A3630"/>
+                </a:solidFill>
+                <a:latin typeface="Source Sans Pro" pitchFamily="34" charset="0"/>
+                <a:ea typeface="Source Sans Pro" pitchFamily="34" charset="-122"/>
+                <a:cs typeface="Source Sans Pro" pitchFamily="34" charset="-120"/>
+              </a:rPr>
+              <a:t>xe, biển số</a:t>
+            </a:r>
+            <a:r>
+              <a:rPr lang="en-US" sz="1850" dirty="0">
+                <a:solidFill>
+                  <a:srgbClr val="3A3630"/>
+                </a:solidFill>
+                <a:latin typeface="Source Sans Pro" pitchFamily="34" charset="0"/>
+                <a:ea typeface="Source Sans Pro" pitchFamily="34" charset="-122"/>
+                <a:cs typeface="Source Sans Pro" pitchFamily="34" charset="-120"/>
+              </a:rPr>
+              <a:t>, </a:t>
+            </a:r>
+            <a:r>
+              <a:rPr lang="en-US" sz="1850" dirty="0" err="1">
+                <a:solidFill>
+                  <a:srgbClr val="3A3630"/>
+                </a:solidFill>
+                <a:latin typeface="Source Sans Pro" pitchFamily="34" charset="0"/>
+                <a:ea typeface="Source Sans Pro" pitchFamily="34" charset="-122"/>
+                <a:cs typeface="Source Sans Pro" pitchFamily="34" charset="-120"/>
+              </a:rPr>
+              <a:t>mở</a:t>
+            </a:r>
+            <a:r>
+              <a:rPr lang="en-US" sz="1850" dirty="0">
+                <a:solidFill>
+                  <a:srgbClr val="3A3630"/>
+                </a:solidFill>
+                <a:latin typeface="Source Sans Pro" pitchFamily="34" charset="0"/>
+                <a:ea typeface="Source Sans Pro" pitchFamily="34" charset="-122"/>
+                <a:cs typeface="Source Sans Pro" pitchFamily="34" charset="-120"/>
+              </a:rPr>
+              <a:t> </a:t>
+            </a:r>
+            <a:r>
+              <a:rPr lang="vi-VN" sz="1850" dirty="0">
+                <a:solidFill>
+                  <a:srgbClr val="3A3630"/>
+                </a:solidFill>
+                <a:latin typeface="Source Sans Pro" pitchFamily="34" charset="0"/>
+                <a:ea typeface="Source Sans Pro" pitchFamily="34" charset="-122"/>
+                <a:cs typeface="Source Sans Pro" pitchFamily="34" charset="-120"/>
+              </a:rPr>
+              <a:t>cổng và mô phỏng xe vào bến bằng động cơ DC-</a:t>
+            </a:r>
+            <a:r>
+              <a:rPr lang="vi-VN" sz="1850" dirty="0" err="1">
+                <a:solidFill>
+                  <a:srgbClr val="3A3630"/>
+                </a:solidFill>
+                <a:latin typeface="Source Sans Pro" pitchFamily="34" charset="0"/>
+                <a:ea typeface="Source Sans Pro" pitchFamily="34" charset="-122"/>
+                <a:cs typeface="Source Sans Pro" pitchFamily="34" charset="-120"/>
+              </a:rPr>
+              <a:t>Motor</a:t>
+            </a:r>
+            <a:endParaRPr lang="vi-VN" sz="1850" dirty="0">
+              <a:solidFill>
+                <a:srgbClr val="3A3630"/>
+              </a:solidFill>
+              <a:latin typeface="Source Sans Pro" pitchFamily="34" charset="0"/>
+              <a:ea typeface="Source Sans Pro" pitchFamily="34" charset="-122"/>
+              <a:cs typeface="Source Sans Pro" pitchFamily="34" charset="-120"/>
+            </a:endParaRPr>
+          </a:p>
+          <a:p>
+            <a:pPr marL="0" indent="0" algn="l">
+              <a:lnSpc>
+                <a:spcPts val="3000"/>
+              </a:lnSpc>
+              <a:buNone/>
+            </a:pPr>
+            <a:r>
+              <a:rPr lang="vi-VN" sz="1850" dirty="0">
+                <a:solidFill>
+                  <a:srgbClr val="3A3630"/>
+                </a:solidFill>
+                <a:latin typeface="Source Sans Pro" pitchFamily="34" charset="0"/>
+                <a:ea typeface="Source Sans Pro" pitchFamily="34" charset="-122"/>
+                <a:cs typeface="Source Sans Pro" pitchFamily="34" charset="-120"/>
+              </a:rPr>
+              <a:t> </a:t>
             </a:r>
             <a:endParaRPr lang="en-US" sz="1850" dirty="0"/>
           </a:p>
@@ -5892,7 +6014,40 @@
                 <a:ea typeface="Source Sans Pro" pitchFamily="34" charset="-122"/>
                 <a:cs typeface="Source Sans Pro" pitchFamily="34" charset="-120"/>
               </a:rPr>
-              <a:t>Chụp ảnh xe vào/ra để quản lý an ninh.</a:t>
+              <a:t>Chụp ảnh xe vào/</a:t>
+            </a:r>
+            <a:r>
+              <a:rPr lang="en-US" sz="1850" dirty="0" err="1">
+                <a:solidFill>
+                  <a:srgbClr val="3A3630"/>
+                </a:solidFill>
+                <a:latin typeface="Source Sans Pro" pitchFamily="34" charset="0"/>
+                <a:ea typeface="Source Sans Pro" pitchFamily="34" charset="-122"/>
+                <a:cs typeface="Source Sans Pro" pitchFamily="34" charset="-120"/>
+              </a:rPr>
+              <a:t>ra</a:t>
+            </a:r>
+            <a:r>
+              <a:rPr lang="vi-VN" sz="1850" dirty="0">
+                <a:solidFill>
+                  <a:srgbClr val="3A3630"/>
+                </a:solidFill>
+                <a:latin typeface="Source Sans Pro" pitchFamily="34" charset="0"/>
+                <a:ea typeface="Source Sans Pro" pitchFamily="34" charset="-122"/>
+                <a:cs typeface="Source Sans Pro" pitchFamily="34" charset="-120"/>
+              </a:rPr>
+              <a:t> tự động</a:t>
+            </a:r>
+            <a:r>
+              <a:rPr lang="en-US" sz="1850" dirty="0">
+                <a:solidFill>
+                  <a:srgbClr val="3A3630"/>
+                </a:solidFill>
+                <a:latin typeface="Source Sans Pro" pitchFamily="34" charset="0"/>
+                <a:ea typeface="Source Sans Pro" pitchFamily="34" charset="-122"/>
+                <a:cs typeface="Source Sans Pro" pitchFamily="34" charset="-120"/>
+              </a:rPr>
+              <a:t> để quản lý an ninh.</a:t>
             </a:r>
             <a:endParaRPr lang="en-US" sz="1850" dirty="0"/>
           </a:p>

</xml_diff>